<commit_message>
Finished adding slides to CNN PPT
</commit_message>
<xml_diff>
--- a/ConvolutionNeuralNetwork.pptx
+++ b/ConvolutionNeuralNetwork.pptx
@@ -5,7 +5,7 @@
     <p:sldMasterId id="2147483732" r:id="rId1"/>
   </p:sldMasterIdLst>
   <p:notesMasterIdLst>
-    <p:notesMasterId r:id="rId20"/>
+    <p:notesMasterId r:id="rId19"/>
   </p:notesMasterIdLst>
   <p:sldIdLst>
     <p:sldId id="350" r:id="rId2"/>
@@ -22,10 +22,9 @@
     <p:sldId id="447" r:id="rId13"/>
     <p:sldId id="450" r:id="rId14"/>
     <p:sldId id="461" r:id="rId15"/>
-    <p:sldId id="452" r:id="rId16"/>
-    <p:sldId id="462" r:id="rId17"/>
-    <p:sldId id="502" r:id="rId18"/>
-    <p:sldId id="495" r:id="rId19"/>
+    <p:sldId id="495" r:id="rId16"/>
+    <p:sldId id="502" r:id="rId17"/>
+    <p:sldId id="503" r:id="rId18"/>
   </p:sldIdLst>
   <p:sldSz cx="9144000" cy="6858000" type="screen4x3"/>
   <p:notesSz cx="6858000" cy="9144000"/>
@@ -153,16 +152,11 @@
             <p14:sldId id="461"/>
           </p14:sldIdLst>
         </p14:section>
-        <p14:section name="Adjustable Parameters" id="{55361FBA-BBD0-44B4-ABB9-19173DCB3C23}">
-          <p14:sldIdLst>
-            <p14:sldId id="452"/>
-            <p14:sldId id="462"/>
-            <p14:sldId id="502"/>
-          </p14:sldIdLst>
-        </p14:section>
         <p14:section name="AlexNet Implementation" id="{84128D97-5FA8-4329-9068-79EDD1194B68}">
           <p14:sldIdLst>
             <p14:sldId id="495"/>
+            <p14:sldId id="502"/>
+            <p14:sldId id="503"/>
           </p14:sldIdLst>
         </p14:section>
       </p14:sectionLst>
@@ -283,7 +277,7 @@
           <a:p>
             <a:fld id="{E91B00C2-1209-4D42-A5F6-19F8482CA1F8}" type="datetimeFigureOut">
               <a:rPr lang="en-US" smtClean="0"/>
-              <a:t>11/11/2017</a:t>
+              <a:t>11/13/2017</a:t>
             </a:fld>
             <a:endParaRPr lang="en-US"/>
           </a:p>
@@ -1296,7 +1290,7 @@
           <a:p>
             <a:fld id="{C51E4E97-A001-0F44-B0B9-428F1549067F}" type="datetimeFigureOut">
               <a:rPr lang="en-US" smtClean="0"/>
-              <a:t>11/11/2017</a:t>
+              <a:t>11/13/2017</a:t>
             </a:fld>
             <a:endParaRPr lang="en-US"/>
           </a:p>
@@ -1486,7 +1480,7 @@
           <a:p>
             <a:fld id="{C51E4E97-A001-0F44-B0B9-428F1549067F}" type="datetimeFigureOut">
               <a:rPr lang="en-US" smtClean="0"/>
-              <a:t>11/11/2017</a:t>
+              <a:t>11/13/2017</a:t>
             </a:fld>
             <a:endParaRPr lang="en-US"/>
           </a:p>
@@ -1668,7 +1662,7 @@
           <a:p>
             <a:fld id="{C51E4E97-A001-0F44-B0B9-428F1549067F}" type="datetimeFigureOut">
               <a:rPr lang="en-US" smtClean="0"/>
-              <a:t>11/11/2017</a:t>
+              <a:t>11/13/2017</a:t>
             </a:fld>
             <a:endParaRPr lang="en-US"/>
           </a:p>
@@ -2090,7 +2084,7 @@
           <a:p>
             <a:fld id="{C51E4E97-A001-0F44-B0B9-428F1549067F}" type="datetimeFigureOut">
               <a:rPr lang="en-US" smtClean="0"/>
-              <a:t>11/11/2017</a:t>
+              <a:t>11/13/2017</a:t>
             </a:fld>
             <a:endParaRPr lang="en-US"/>
           </a:p>
@@ -2466,7 +2460,7 @@
           <a:p>
             <a:fld id="{C51E4E97-A001-0F44-B0B9-428F1549067F}" type="datetimeFigureOut">
               <a:rPr lang="en-US" smtClean="0"/>
-              <a:t>11/11/2017</a:t>
+              <a:t>11/13/2017</a:t>
             </a:fld>
             <a:endParaRPr lang="en-US"/>
           </a:p>
@@ -2877,7 +2871,7 @@
           <a:p>
             <a:fld id="{C51E4E97-A001-0F44-B0B9-428F1549067F}" type="datetimeFigureOut">
               <a:rPr lang="en-US" smtClean="0"/>
-              <a:t>11/11/2017</a:t>
+              <a:t>11/13/2017</a:t>
             </a:fld>
             <a:endParaRPr lang="en-US"/>
           </a:p>
@@ -3015,7 +3009,7 @@
           <a:p>
             <a:fld id="{C51E4E97-A001-0F44-B0B9-428F1549067F}" type="datetimeFigureOut">
               <a:rPr lang="en-US" smtClean="0"/>
-              <a:t>11/11/2017</a:t>
+              <a:t>11/13/2017</a:t>
             </a:fld>
             <a:endParaRPr lang="en-US"/>
           </a:p>
@@ -3123,7 +3117,7 @@
           <a:p>
             <a:fld id="{C51E4E97-A001-0F44-B0B9-428F1549067F}" type="datetimeFigureOut">
               <a:rPr lang="en-US" smtClean="0"/>
-              <a:t>11/11/2017</a:t>
+              <a:t>11/13/2017</a:t>
             </a:fld>
             <a:endParaRPr lang="en-US"/>
           </a:p>
@@ -3375,7 +3369,7 @@
           <a:p>
             <a:fld id="{C51E4E97-A001-0F44-B0B9-428F1549067F}" type="datetimeFigureOut">
               <a:rPr lang="en-US" smtClean="0"/>
-              <a:t>11/11/2017</a:t>
+              <a:t>11/13/2017</a:t>
             </a:fld>
             <a:endParaRPr lang="en-US"/>
           </a:p>
@@ -3626,7 +3620,7 @@
           <a:p>
             <a:fld id="{C51E4E97-A001-0F44-B0B9-428F1549067F}" type="datetimeFigureOut">
               <a:rPr lang="en-US" smtClean="0"/>
-              <a:t>11/11/2017</a:t>
+              <a:t>11/13/2017</a:t>
             </a:fld>
             <a:endParaRPr lang="en-US"/>
           </a:p>
@@ -4456,7 +4450,7 @@
           <a:p>
             <a:fld id="{C51E4E97-A001-0F44-B0B9-428F1549067F}" type="datetimeFigureOut">
               <a:rPr lang="en-US" smtClean="0"/>
-              <a:t>11/11/2017</a:t>
+              <a:t>11/13/2017</a:t>
             </a:fld>
             <a:endParaRPr lang="en-US"/>
           </a:p>
@@ -5237,13 +5231,13 @@
           <a:p>
             <a:r>
               <a:rPr lang="en-US" dirty="0"/>
-              <a:t>Filter sizes are smaller in terms of width and height than the previous layer, but they have the same depth.</a:t>
+              <a:t>Filters have a smaller width and height than the previous layer, but they must have the same depth.</a:t>
             </a:r>
           </a:p>
           <a:p>
             <a:r>
               <a:rPr lang="en-US" dirty="0"/>
-              <a:t>Filters are meant to detect edges and patterns inside of an image.</a:t>
+              <a:t>Filters are used to detect edges and patterns inside of an image.</a:t>
             </a:r>
           </a:p>
           <a:p>
@@ -5563,7 +5557,7 @@
           <a:p>
             <a:r>
               <a:rPr lang="en-US" dirty="0"/>
-              <a:t>Lets use a 4x4x3 filter (the last dimension MUST be 5) this filter has a stride length of 1 meaning that the filter moves one pixel at a time (this value can be modified).</a:t>
+              <a:t>Lets use a 4x4 filter with a stride length of 1, this means that the filter moves one pixel at a time (this value can be modified).</a:t>
             </a:r>
           </a:p>
           <a:p>
@@ -6512,7 +6506,7 @@
           <a:p>
             <a:r>
               <a:rPr lang="en-US" sz="2000" dirty="0"/>
-              <a:t>The pooling layer takes information from the previous layer and lowers the special dimensionality  (Width x Height) of the information. A pooling layer is usually placed between convolutional layers. This is usually done in 2x2 sections.</a:t>
+              <a:t>The pooling layer takes information from the previous layer and lowers the spatial dimensionality  (Width x Height) of the information. A pooling layer is usually placed between convolutional layers. This is typically done in 2x2 sections.</a:t>
             </a:r>
           </a:p>
           <a:p>
@@ -6545,14 +6539,14 @@
             <a:pPr lvl="1"/>
             <a:r>
               <a:rPr lang="en-US" sz="2000" dirty="0"/>
-              <a:t>Max Pooling – The most common practice, takes max value in the 2x2 section</a:t>
+              <a:t>Max Pooling – The most common practice, takes max value in the section</a:t>
             </a:r>
           </a:p>
           <a:p>
             <a:pPr lvl="1"/>
             <a:r>
               <a:rPr lang="en-US" sz="2000" dirty="0"/>
-              <a:t>Average Pooling – Takes the average of all 4 values and places it in the new matrix</a:t>
+              <a:t>Average Pooling – Takes the average of all values and places it in the new matrix</a:t>
             </a:r>
           </a:p>
         </p:txBody>
@@ -6722,7 +6716,7 @@
           <a:p>
             <a:r>
               <a:rPr lang="en-US" dirty="0"/>
-              <a:t>In practice the equation for </a:t>
+              <a:t>The main purpose of the </a:t>
             </a:r>
             <a:r>
               <a:rPr lang="en-US" dirty="0" err="1"/>
@@ -6730,60 +6724,97 @@
             </a:r>
             <a:r>
               <a:rPr lang="en-US" dirty="0"/>
-              <a:t> is </a:t>
-            </a:r>
-            <a:r>
-              <a:rPr lang="en-US" i="1" dirty="0"/>
-              <a:t>max</a:t>
+              <a:t> is to set all negative values to zero. </a:t>
+            </a:r>
+          </a:p>
+          <a:p>
+            <a:r>
+              <a:rPr lang="en-US" dirty="0" err="1"/>
+              <a:t>ReLU</a:t>
             </a:r>
             <a:r>
               <a:rPr lang="en-US" dirty="0"/>
-              <a:t>(0, </a:t>
-            </a:r>
-            <a:r>
-              <a:rPr lang="en-US" i="1" dirty="0"/>
-              <a:t>x</a:t>
-            </a:r>
+              <a:t> keeps the weights at each node from increasing to infinity or getting stuck near zero.</a:t>
+            </a:r>
+          </a:p>
+          <a:p>
             <a:r>
               <a:rPr lang="en-US" dirty="0"/>
-              <a:t>) which is not differentiable at the origin which leads to difficulties when training with </a:t>
+              <a:t>The output size of a </a:t>
             </a:r>
             <a:r>
               <a:rPr lang="en-US" dirty="0" err="1"/>
-              <a:t>backpropogation</a:t>
+              <a:t>ReLU</a:t>
             </a:r>
             <a:r>
               <a:rPr lang="en-US" dirty="0"/>
-              <a:t>.</a:t>
-            </a:r>
-          </a:p>
+              <a:t> layer is identical to the input size.</a:t>
+            </a:r>
+          </a:p>
+        </p:txBody>
+      </p:sp>
+      <p:pic>
+        <p:nvPicPr>
+          <p:cNvPr id="4" name="Picture 3">
+            <a:extLst>
+              <a:ext uri="{FF2B5EF4-FFF2-40B4-BE49-F238E27FC236}">
+                <a16:creationId xmlns:a16="http://schemas.microsoft.com/office/drawing/2014/main" id="{7FAE2976-B8D3-444C-8C2D-EA008F014C37}"/>
+              </a:ext>
+            </a:extLst>
+          </p:cNvPr>
+          <p:cNvPicPr>
+            <a:picLocks noChangeAspect="1"/>
+          </p:cNvPicPr>
+          <p:nvPr/>
+        </p:nvPicPr>
+        <p:blipFill>
+          <a:blip r:embed="rId2"/>
+          <a:stretch>
+            <a:fillRect/>
+          </a:stretch>
+        </p:blipFill>
+        <p:spPr>
+          <a:xfrm>
+            <a:off x="2387600" y="4175172"/>
+            <a:ext cx="4368800" cy="2174352"/>
+          </a:xfrm>
+          <a:prstGeom prst="rect">
+            <a:avLst/>
+          </a:prstGeom>
+        </p:spPr>
+      </p:pic>
+      <p:sp>
+        <p:nvSpPr>
+          <p:cNvPr id="5" name="TextBox 4">
+            <a:extLst>
+              <a:ext uri="{FF2B5EF4-FFF2-40B4-BE49-F238E27FC236}">
+                <a16:creationId xmlns:a16="http://schemas.microsoft.com/office/drawing/2014/main" id="{D06C56B1-7FC8-4D50-AC57-521BC7E3D9A0}"/>
+              </a:ext>
+            </a:extLst>
+          </p:cNvPr>
+          <p:cNvSpPr txBox="1"/>
+          <p:nvPr/>
+        </p:nvSpPr>
+        <p:spPr>
+          <a:xfrm>
+            <a:off x="643681" y="6463268"/>
+            <a:ext cx="7856638" cy="369332"/>
+          </a:xfrm>
+          <a:prstGeom prst="rect">
+            <a:avLst/>
+          </a:prstGeom>
+          <a:noFill/>
+        </p:spPr>
+        <p:txBody>
+          <a:bodyPr wrap="none" rtlCol="0">
+            <a:spAutoFit/>
+          </a:bodyPr>
+          <a:lstStyle/>
           <a:p>
             <a:r>
               <a:rPr lang="en-US" dirty="0"/>
-              <a:t>The actual function used is the </a:t>
-            </a:r>
-            <a:r>
-              <a:rPr lang="en-US" dirty="0" err="1"/>
-              <a:t>Softplus</a:t>
-            </a:r>
-            <a:r>
-              <a:rPr lang="en-US" dirty="0"/>
-              <a:t> function </a:t>
-            </a:r>
-            <a:r>
-              <a:rPr lang="en-US" i="1" dirty="0"/>
-              <a:t>f(x) = ln(1+e^x)</a:t>
-            </a:r>
-            <a:endParaRPr lang="en-US" dirty="0"/>
-          </a:p>
-          <a:p>
-            <a:r>
-              <a:rPr lang="en-US" dirty="0"/>
-              <a:t>The derivative of this function is the sigmoid function, which we have seen in MLP</a:t>
-            </a:r>
-          </a:p>
-          <a:p>
-            <a:endParaRPr lang="en-US" dirty="0"/>
+              <a:t>http://brohrer.github.io/how_convolutional_neural_networks_work.html</a:t>
+            </a:r>
           </a:p>
         </p:txBody>
       </p:sp>
@@ -6871,74 +6902,89 @@
           <a:p>
             <a:r>
               <a:rPr lang="en-US" dirty="0"/>
-              <a:t>What does the attacker know?</a:t>
-            </a:r>
-          </a:p>
-          <a:p>
-            <a:r>
-              <a:rPr lang="en-US" b="1" dirty="0"/>
-              <a:t>Perfect Knowledge </a:t>
-            </a:r>
+              <a:t>This is the same as a layer from an MLP</a:t>
+            </a:r>
+          </a:p>
+          <a:p>
             <a:r>
               <a:rPr lang="en-US" dirty="0"/>
-              <a:t>– the attacker knows everything about the machine learning algorithm</a:t>
-            </a:r>
-          </a:p>
-          <a:p>
-            <a:r>
-              <a:rPr lang="en-US" b="1" dirty="0"/>
-              <a:t>Limited Knowledge </a:t>
-            </a:r>
+              <a:t>These layers are placed at the end of the network to determine which class each image belongs in.</a:t>
+            </a:r>
+          </a:p>
+          <a:p>
             <a:r>
               <a:rPr lang="en-US" dirty="0"/>
-              <a:t>– the attacker has some limited knowledge about the machine learning algorithm </a:t>
-            </a:r>
-          </a:p>
-          <a:p>
-            <a:pPr lvl="1"/>
-            <a:r>
-              <a:rPr lang="en-US" b="1" dirty="0"/>
-              <a:t>How limited?</a:t>
-            </a:r>
-          </a:p>
-          <a:p>
-            <a:pPr lvl="1"/>
-            <a:r>
-              <a:rPr lang="en-US" dirty="0"/>
-              <a:t>Do they know what algorithm you are using?</a:t>
-            </a:r>
-          </a:p>
-          <a:p>
-            <a:pPr lvl="1"/>
-            <a:r>
-              <a:rPr lang="en-US" dirty="0"/>
-              <a:t>Do they know the algorithm free parameters?</a:t>
-            </a:r>
-          </a:p>
-          <a:p>
-            <a:pPr lvl="1"/>
-            <a:r>
-              <a:rPr lang="en-US" dirty="0"/>
-              <a:t>Do they know the optimized algorithm parameters?</a:t>
-            </a:r>
-          </a:p>
-          <a:p>
-            <a:pPr lvl="1"/>
-            <a:r>
-              <a:rPr lang="en-US" dirty="0"/>
-              <a:t>Do they know the data passed into the algorithm?</a:t>
-            </a:r>
-          </a:p>
-          <a:p>
-            <a:pPr lvl="2"/>
-            <a:r>
-              <a:rPr lang="en-US" dirty="0"/>
-              <a:t>Or maybe they can guess where your data comes from based on the application. Ex. ImageNet if the application is object recognition</a:t>
+              <a:t>These fully connected layers compute the final likelihoods for each class and from these values a final classification is made.</a:t>
             </a:r>
           </a:p>
           <a:p>
             <a:pPr lvl="2"/>
             <a:endParaRPr lang="en-US" dirty="0"/>
+          </a:p>
+        </p:txBody>
+      </p:sp>
+      <p:pic>
+        <p:nvPicPr>
+          <p:cNvPr id="4" name="Picture 3">
+            <a:extLst>
+              <a:ext uri="{FF2B5EF4-FFF2-40B4-BE49-F238E27FC236}">
+                <a16:creationId xmlns:a16="http://schemas.microsoft.com/office/drawing/2014/main" id="{29D19328-AAC0-4C04-8A68-156E202BEC6B}"/>
+              </a:ext>
+            </a:extLst>
+          </p:cNvPr>
+          <p:cNvPicPr>
+            <a:picLocks noChangeAspect="1"/>
+          </p:cNvPicPr>
+          <p:nvPr/>
+        </p:nvPicPr>
+        <p:blipFill>
+          <a:blip r:embed="rId2"/>
+          <a:stretch>
+            <a:fillRect/>
+          </a:stretch>
+        </p:blipFill>
+        <p:spPr>
+          <a:xfrm>
+            <a:off x="2251868" y="3234827"/>
+            <a:ext cx="4640263" cy="3114697"/>
+          </a:xfrm>
+          <a:prstGeom prst="rect">
+            <a:avLst/>
+          </a:prstGeom>
+        </p:spPr>
+      </p:pic>
+      <p:sp>
+        <p:nvSpPr>
+          <p:cNvPr id="5" name="TextBox 4">
+            <a:extLst>
+              <a:ext uri="{FF2B5EF4-FFF2-40B4-BE49-F238E27FC236}">
+                <a16:creationId xmlns:a16="http://schemas.microsoft.com/office/drawing/2014/main" id="{901E9E4E-64A4-4D6E-A263-85BCDFCE4BA8}"/>
+              </a:ext>
+            </a:extLst>
+          </p:cNvPr>
+          <p:cNvSpPr txBox="1"/>
+          <p:nvPr/>
+        </p:nvSpPr>
+        <p:spPr>
+          <a:xfrm>
+            <a:off x="643680" y="6475491"/>
+            <a:ext cx="7856638" cy="369332"/>
+          </a:xfrm>
+          <a:prstGeom prst="rect">
+            <a:avLst/>
+          </a:prstGeom>
+          <a:noFill/>
+        </p:spPr>
+        <p:txBody>
+          <a:bodyPr wrap="none" rtlCol="0">
+            <a:spAutoFit/>
+          </a:bodyPr>
+          <a:lstStyle/>
+          <a:p>
+            <a:r>
+              <a:rPr lang="en-US" dirty="0"/>
+              <a:t>http://brohrer.github.io/how_convolutional_neural_networks_work.html</a:t>
+            </a:r>
           </a:p>
         </p:txBody>
       </p:sp>
@@ -6980,7 +7026,7 @@
           <p:cNvPr id="4" name="Title 3">
             <a:extLst>
               <a:ext uri="{FF2B5EF4-FFF2-40B4-BE49-F238E27FC236}">
-                <a16:creationId xmlns:a16="http://schemas.microsoft.com/office/drawing/2014/main" id="{089344F2-BE90-4076-86A1-56012BAD4036}"/>
+                <a16:creationId xmlns:a16="http://schemas.microsoft.com/office/drawing/2014/main" id="{BDEEF7C9-9913-4E9E-B2E1-24DC48660353}"/>
               </a:ext>
             </a:extLst>
           </p:cNvPr>
@@ -6991,20 +7037,24 @@
             <p:ph type="title"/>
           </p:nvPr>
         </p:nvSpPr>
-        <p:spPr>
-          <a:xfrm>
-            <a:off x="722313" y="1981200"/>
-            <a:ext cx="7772400" cy="1362075"/>
-          </a:xfrm>
-        </p:spPr>
+        <p:spPr/>
         <p:txBody>
           <a:bodyPr/>
           <a:lstStyle/>
           <a:p>
             <a:r>
+              <a:rPr lang="en-US" dirty="0" err="1"/>
+              <a:t>AlexNet</a:t>
+            </a:r>
+            <a:r>
               <a:rPr lang="en-US" dirty="0"/>
-              <a:t>Adjustable Parameters</a:t>
-            </a:r>
+              <a:t> </a:t>
+            </a:r>
+            <a:r>
+              <a:rPr lang="en-US"/>
+              <a:t>Implementaion</a:t>
+            </a:r>
+            <a:endParaRPr lang="en-US" dirty="0"/>
           </a:p>
         </p:txBody>
       </p:sp>
@@ -7013,7 +7063,7 @@
           <p:cNvPr id="5" name="Text Placeholder 4">
             <a:extLst>
               <a:ext uri="{FF2B5EF4-FFF2-40B4-BE49-F238E27FC236}">
-                <a16:creationId xmlns:a16="http://schemas.microsoft.com/office/drawing/2014/main" id="{2D595F60-9B5B-45C4-9B65-033A3C54E173}"/>
+                <a16:creationId xmlns:a16="http://schemas.microsoft.com/office/drawing/2014/main" id="{22C2E355-E2EA-42D2-AA35-333C561CA354}"/>
               </a:ext>
             </a:extLst>
           </p:cNvPr>
@@ -7026,28 +7076,17 @@
         </p:nvSpPr>
         <p:spPr/>
         <p:txBody>
-          <a:bodyPr>
-            <a:normAutofit/>
-          </a:bodyPr>
+          <a:bodyPr/>
           <a:lstStyle/>
           <a:p>
-            <a:r>
-              <a:rPr lang="en-US" dirty="0"/>
-              <a:t>Filters</a:t>
-            </a:r>
-          </a:p>
-          <a:p>
-            <a:r>
-              <a:rPr lang="en-US" dirty="0"/>
-              <a:t>Pooling</a:t>
-            </a:r>
+            <a:endParaRPr lang="en-US"/>
           </a:p>
         </p:txBody>
       </p:sp>
     </p:spTree>
     <p:extLst>
       <p:ext uri="{BB962C8B-B14F-4D97-AF65-F5344CB8AC3E}">
-        <p14:creationId xmlns:p14="http://schemas.microsoft.com/office/powerpoint/2010/main" val="698873501"/>
+        <p14:creationId xmlns:p14="http://schemas.microsoft.com/office/powerpoint/2010/main" val="3196821120"/>
       </p:ext>
     </p:extLst>
   </p:cSld>
@@ -7079,10 +7118,10 @@
       </p:grpSpPr>
       <p:sp>
         <p:nvSpPr>
-          <p:cNvPr id="4" name="Title 3">
+          <p:cNvPr id="2" name="Title 1">
             <a:extLst>
               <a:ext uri="{FF2B5EF4-FFF2-40B4-BE49-F238E27FC236}">
-                <a16:creationId xmlns:a16="http://schemas.microsoft.com/office/drawing/2014/main" id="{B50F879F-78AC-4B33-803D-BA6ECB3BB0ED}"/>
+                <a16:creationId xmlns:a16="http://schemas.microsoft.com/office/drawing/2014/main" id="{A6CA7FE8-90D8-4489-AC88-7798B2FEAEA0}"/>
               </a:ext>
             </a:extLst>
           </p:cNvPr>
@@ -7099,18 +7138,22 @@
           <a:lstStyle/>
           <a:p>
             <a:r>
+              <a:rPr lang="en-US" dirty="0" err="1"/>
+              <a:t>AlexNet</a:t>
+            </a:r>
+            <a:r>
               <a:rPr lang="en-US" dirty="0"/>
-              <a:t>Filters</a:t>
-            </a:r>
-          </a:p>
-        </p:txBody>
-      </p:sp>
-      <p:sp>
-        <p:nvSpPr>
-          <p:cNvPr id="5" name="Content Placeholder 4">
+              <a:t> Architecture</a:t>
+            </a:r>
+          </a:p>
+        </p:txBody>
+      </p:sp>
+      <p:sp>
+        <p:nvSpPr>
+          <p:cNvPr id="3" name="Content Placeholder 2">
             <a:extLst>
               <a:ext uri="{FF2B5EF4-FFF2-40B4-BE49-F238E27FC236}">
-                <a16:creationId xmlns:a16="http://schemas.microsoft.com/office/drawing/2014/main" id="{A7D1C25B-F4D2-4899-8911-6AB7F68A6C7D}"/>
+                <a16:creationId xmlns:a16="http://schemas.microsoft.com/office/drawing/2014/main" id="{8A03CD30-B057-48BE-8048-FC9F2406E4CD}"/>
               </a:ext>
             </a:extLst>
           </p:cNvPr>
@@ -7123,28 +7166,64 @@
         </p:nvSpPr>
         <p:spPr/>
         <p:txBody>
-          <a:bodyPr/>
+          <a:bodyPr>
+            <a:normAutofit/>
+          </a:bodyPr>
           <a:lstStyle/>
           <a:p>
             <a:r>
-              <a:rPr lang="en-US" dirty="0"/>
-              <a:t>The number of and size of filter layers can be modified for each convolutional layer.</a:t>
-            </a:r>
-          </a:p>
-          <a:p>
-            <a:r>
-              <a:rPr lang="en-US" dirty="0"/>
-              <a:t>Ex. A 4x4 filter shape with 30 filters and the next convolutional layer can have a 5x5 filter shape with 5 filters.</a:t>
-            </a:r>
-          </a:p>
-        </p:txBody>
-      </p:sp>
-      <p:sp>
-        <p:nvSpPr>
-          <p:cNvPr id="6" name="Rectangle 5">
+              <a:rPr lang="en-US" sz="2000" dirty="0" err="1"/>
+              <a:t>AlexNet</a:t>
+            </a:r>
+            <a:r>
+              <a:rPr lang="en-US" sz="2000" dirty="0"/>
+              <a:t> is a CNN trained to perform large scale image recognition.</a:t>
+            </a:r>
+          </a:p>
+          <a:p>
+            <a:pPr lvl="1"/>
+            <a:r>
+              <a:rPr lang="en-US" sz="2000" dirty="0"/>
+              <a:t>1.2 Million Images in 1000 classes</a:t>
+            </a:r>
+          </a:p>
+          <a:p>
+            <a:r>
+              <a:rPr lang="en-US" sz="2000" dirty="0"/>
+              <a:t>Constructed of 5 convolutional layers, 3 max pooling, and 3 fully connected layers.</a:t>
+            </a:r>
+          </a:p>
+          <a:p>
+            <a:pPr lvl="1"/>
+            <a:r>
+              <a:rPr lang="en-US" sz="2000" dirty="0"/>
+              <a:t>650K neurons</a:t>
+            </a:r>
+          </a:p>
+          <a:p>
+            <a:pPr lvl="1"/>
+            <a:r>
+              <a:rPr lang="en-US" sz="2000" dirty="0"/>
+              <a:t>60 Million parameters</a:t>
+            </a:r>
+          </a:p>
+          <a:p>
+            <a:r>
+              <a:rPr lang="en-US" sz="2000" dirty="0"/>
+              <a:t>Took 5 to 6 days to train on 2 GPUs</a:t>
+            </a:r>
+          </a:p>
+          <a:p>
+            <a:endParaRPr lang="en-US" sz="2000" dirty="0"/>
+          </a:p>
+        </p:txBody>
+      </p:sp>
+      <p:sp>
+        <p:nvSpPr>
+          <p:cNvPr id="5" name="Rectangle 4">
             <a:extLst>
               <a:ext uri="{FF2B5EF4-FFF2-40B4-BE49-F238E27FC236}">
-                <a16:creationId xmlns:a16="http://schemas.microsoft.com/office/drawing/2014/main" id="{CB43237C-7866-4B0E-B319-62FC586142FA}"/>
+                <a16:creationId xmlns:a16="http://schemas.microsoft.com/office/drawing/2014/main" id="{18D83247-D0D6-421E-829C-DA7F88DB72B0}"/>
               </a:ext>
             </a:extLst>
           </p:cNvPr>
@@ -7153,8 +7232,8 @@
         </p:nvSpPr>
         <p:spPr>
           <a:xfrm>
-            <a:off x="0" y="6122292"/>
-            <a:ext cx="8905460" cy="646331"/>
+            <a:off x="0" y="6376208"/>
+            <a:ext cx="9144000" cy="784830"/>
           </a:xfrm>
           <a:prstGeom prst="rect">
             <a:avLst/>
@@ -7167,16 +7246,84 @@
           <a:lstStyle/>
           <a:p>
             <a:r>
-              <a:rPr lang="en-US" dirty="0"/>
-              <a:t>[1] J. Newsome, B. Karp, and D. Song, “Paragraph: Thwarting Signature Learning by Training Maliciously,” Recent Adv. Intrusion Detect., vol. 4219, pp. 81–105, 2006.</a:t>
-            </a:r>
-          </a:p>
-        </p:txBody>
-      </p:sp>
+              <a:rPr lang="en-US" sz="1500" dirty="0"/>
+              <a:t>http://vision.stanford.edu/teaching/cs231b_spring1415/slides/alexnet_tugce_kyunghee.pdf</a:t>
+            </a:r>
+          </a:p>
+          <a:p>
+            <a:r>
+              <a:rPr lang="en-US" sz="1500" dirty="0"/>
+              <a:t>http://www.image-net.org/challenges/LSVRC/2012/supervision.pdf</a:t>
+            </a:r>
+          </a:p>
+          <a:p>
+            <a:endParaRPr lang="en-US" sz="1500" dirty="0"/>
+          </a:p>
+        </p:txBody>
+      </p:sp>
+      <p:pic>
+        <p:nvPicPr>
+          <p:cNvPr id="6" name="Picture 5">
+            <a:extLst>
+              <a:ext uri="{FF2B5EF4-FFF2-40B4-BE49-F238E27FC236}">
+                <a16:creationId xmlns:a16="http://schemas.microsoft.com/office/drawing/2014/main" id="{CDB30520-F681-4C51-B1BF-1E27C280F4C9}"/>
+              </a:ext>
+            </a:extLst>
+          </p:cNvPr>
+          <p:cNvPicPr>
+            <a:picLocks noChangeAspect="1"/>
+          </p:cNvPicPr>
+          <p:nvPr/>
+        </p:nvPicPr>
+        <p:blipFill>
+          <a:blip r:embed="rId2"/>
+          <a:stretch>
+            <a:fillRect/>
+          </a:stretch>
+        </p:blipFill>
+        <p:spPr>
+          <a:xfrm>
+            <a:off x="0" y="3551143"/>
+            <a:ext cx="2466243" cy="2778426"/>
+          </a:xfrm>
+          <a:prstGeom prst="rect">
+            <a:avLst/>
+          </a:prstGeom>
+        </p:spPr>
+      </p:pic>
+      <p:pic>
+        <p:nvPicPr>
+          <p:cNvPr id="7" name="Picture 6">
+            <a:extLst>
+              <a:ext uri="{FF2B5EF4-FFF2-40B4-BE49-F238E27FC236}">
+                <a16:creationId xmlns:a16="http://schemas.microsoft.com/office/drawing/2014/main" id="{D83E7B8A-B3EF-4C99-8125-0EA7592327B5}"/>
+              </a:ext>
+            </a:extLst>
+          </p:cNvPr>
+          <p:cNvPicPr>
+            <a:picLocks noChangeAspect="1"/>
+          </p:cNvPicPr>
+          <p:nvPr/>
+        </p:nvPicPr>
+        <p:blipFill rotWithShape="1">
+          <a:blip r:embed="rId3"/>
+          <a:srcRect l="553" t="1" r="466" b="3516"/>
+          <a:stretch/>
+        </p:blipFill>
+        <p:spPr>
+          <a:xfrm>
+            <a:off x="2466243" y="4326144"/>
+            <a:ext cx="6750050" cy="2003425"/>
+          </a:xfrm>
+          <a:prstGeom prst="rect">
+            <a:avLst/>
+          </a:prstGeom>
+        </p:spPr>
+      </p:pic>
     </p:spTree>
     <p:extLst>
       <p:ext uri="{BB962C8B-B14F-4D97-AF65-F5344CB8AC3E}">
-        <p14:creationId xmlns:p14="http://schemas.microsoft.com/office/powerpoint/2010/main" val="975795466"/>
+        <p14:creationId xmlns:p14="http://schemas.microsoft.com/office/powerpoint/2010/main" val="2301167693"/>
       </p:ext>
     </p:extLst>
   </p:cSld>
@@ -7208,10 +7355,10 @@
       </p:grpSpPr>
       <p:sp>
         <p:nvSpPr>
-          <p:cNvPr id="4" name="Title 3">
+          <p:cNvPr id="2" name="Title 1">
             <a:extLst>
               <a:ext uri="{FF2B5EF4-FFF2-40B4-BE49-F238E27FC236}">
-                <a16:creationId xmlns:a16="http://schemas.microsoft.com/office/drawing/2014/main" id="{B50F879F-78AC-4B33-803D-BA6ECB3BB0ED}"/>
+                <a16:creationId xmlns:a16="http://schemas.microsoft.com/office/drawing/2014/main" id="{485FF813-7F7A-421B-A7AA-20E5B83AC666}"/>
               </a:ext>
             </a:extLst>
           </p:cNvPr>
@@ -7229,17 +7376,47 @@
           <a:p>
             <a:r>
               <a:rPr lang="en-US" dirty="0"/>
-              <a:t>Pooling</a:t>
-            </a:r>
-          </a:p>
-        </p:txBody>
-      </p:sp>
-      <p:sp>
-        <p:nvSpPr>
-          <p:cNvPr id="5" name="Content Placeholder 4">
+              <a:t>Some Examples of Classifications</a:t>
+            </a:r>
+          </a:p>
+        </p:txBody>
+      </p:sp>
+      <p:pic>
+        <p:nvPicPr>
+          <p:cNvPr id="4" name="Picture 3">
             <a:extLst>
               <a:ext uri="{FF2B5EF4-FFF2-40B4-BE49-F238E27FC236}">
-                <a16:creationId xmlns:a16="http://schemas.microsoft.com/office/drawing/2014/main" id="{A7D1C25B-F4D2-4899-8911-6AB7F68A6C7D}"/>
+                <a16:creationId xmlns:a16="http://schemas.microsoft.com/office/drawing/2014/main" id="{ED8C29C9-628A-4DBA-9337-2661780E55C7}"/>
+              </a:ext>
+            </a:extLst>
+          </p:cNvPr>
+          <p:cNvPicPr>
+            <a:picLocks noChangeAspect="1"/>
+          </p:cNvPicPr>
+          <p:nvPr/>
+        </p:nvPicPr>
+        <p:blipFill>
+          <a:blip r:embed="rId2"/>
+          <a:stretch>
+            <a:fillRect/>
+          </a:stretch>
+        </p:blipFill>
+        <p:spPr>
+          <a:xfrm>
+            <a:off x="1559282" y="1687153"/>
+            <a:ext cx="6025436" cy="5030671"/>
+          </a:xfrm>
+          <a:prstGeom prst="rect">
+            <a:avLst/>
+          </a:prstGeom>
+        </p:spPr>
+      </p:pic>
+      <p:sp>
+        <p:nvSpPr>
+          <p:cNvPr id="6" name="Content Placeholder 2">
+            <a:extLst>
+              <a:ext uri="{FF2B5EF4-FFF2-40B4-BE49-F238E27FC236}">
+                <a16:creationId xmlns:a16="http://schemas.microsoft.com/office/drawing/2014/main" id="{7613C229-21A3-4EBF-B862-85B1B02E36A8}"/>
               </a:ext>
             </a:extLst>
           </p:cNvPr>
@@ -7250,84 +7427,56 @@
             <p:ph idx="1"/>
           </p:nvPr>
         </p:nvSpPr>
-        <p:spPr/>
-        <p:txBody>
-          <a:bodyPr/>
+        <p:spPr>
+          <a:xfrm>
+            <a:off x="0" y="1181099"/>
+            <a:ext cx="9144000" cy="5168425"/>
+          </a:xfrm>
+        </p:spPr>
+        <p:txBody>
+          <a:bodyPr>
+            <a:normAutofit/>
+          </a:bodyPr>
           <a:lstStyle/>
           <a:p>
             <a:r>
-              <a:rPr lang="en-US" dirty="0"/>
-              <a:t>The method of and size of pooling can be changed on each layer.</a:t>
-            </a:r>
-          </a:p>
-          <a:p>
-            <a:r>
-              <a:rPr lang="en-US" dirty="0"/>
-              <a:t>Ex. A pooling layer can consist of a 2x2 shape with Max pooling and the next convolutional layer can have a 4x4 shape with Average pooling.</a:t>
-            </a:r>
-          </a:p>
-        </p:txBody>
-      </p:sp>
-      <p:sp>
-        <p:nvSpPr>
-          <p:cNvPr id="6" name="Rectangle 5">
+              <a:rPr lang="en-US" sz="2000" dirty="0"/>
+              <a:t>Examples of classifications made for the Large Scale Visual Recognition Challenge 2010</a:t>
+            </a:r>
+          </a:p>
+        </p:txBody>
+      </p:sp>
+      <p:sp>
+        <p:nvSpPr>
+          <p:cNvPr id="7" name="TextBox 6">
             <a:extLst>
               <a:ext uri="{FF2B5EF4-FFF2-40B4-BE49-F238E27FC236}">
-                <a16:creationId xmlns:a16="http://schemas.microsoft.com/office/drawing/2014/main" id="{CB43237C-7866-4B0E-B319-62FC586142FA}"/>
+                <a16:creationId xmlns:a16="http://schemas.microsoft.com/office/drawing/2014/main" id="{8FBB4ACA-654E-4605-9F58-B6DA32F8053C}"/>
               </a:ext>
             </a:extLst>
           </p:cNvPr>
-          <p:cNvSpPr/>
+          <p:cNvSpPr txBox="1"/>
           <p:nvPr/>
         </p:nvSpPr>
         <p:spPr>
           <a:xfrm>
-            <a:off x="0" y="6122292"/>
-            <a:ext cx="8905460" cy="646331"/>
+            <a:off x="0" y="6532413"/>
+            <a:ext cx="9129422" cy="323165"/>
           </a:xfrm>
           <a:prstGeom prst="rect">
             <a:avLst/>
           </a:prstGeom>
+          <a:noFill/>
         </p:spPr>
         <p:txBody>
-          <a:bodyPr wrap="square">
+          <a:bodyPr wrap="none" rtlCol="0">
             <a:spAutoFit/>
           </a:bodyPr>
           <a:lstStyle/>
           <a:p>
-            <a:pPr marL="0" marR="0" lvl="0" indent="0" algn="l" defTabSz="457200" rtl="0" eaLnBrk="1" fontAlgn="auto" latinLnBrk="0" hangingPunct="1">
-              <a:lnSpc>
-                <a:spcPct val="100000"/>
-              </a:lnSpc>
-              <a:spcBef>
-                <a:spcPts val="0"/>
-              </a:spcBef>
-              <a:spcAft>
-                <a:spcPts val="0"/>
-              </a:spcAft>
-              <a:buClrTx/>
-              <a:buSzTx/>
-              <a:buFontTx/>
-              <a:buNone/>
-              <a:tabLst/>
-              <a:defRPr/>
-            </a:pPr>
-            <a:r>
-              <a:rPr kumimoji="0" lang="en-US" sz="1800" b="0" i="0" u="none" strike="noStrike" kern="1200" cap="none" spc="0" normalizeH="0" baseline="0" noProof="0" dirty="0">
-                <a:ln>
-                  <a:noFill/>
-                </a:ln>
-                <a:solidFill>
-                  <a:prstClr val="black"/>
-                </a:solidFill>
-                <a:effectLst/>
-                <a:uLnTx/>
-                <a:uFillTx/>
-                <a:latin typeface="Georgia"/>
-                <a:ea typeface="+mn-ea"/>
-                <a:cs typeface="+mn-cs"/>
-              </a:rPr>
-              <a:t>[1] J. Newsome, B. Karp, and D. Song, “Paragraph: Thwarting Signature Learning by Training Maliciously,” Recent Adv. Intrusion Detect., vol. 4219, pp. 81–105, 2006.</a:t>
+            <a:r>
+              <a:rPr lang="en-US" sz="1500" dirty="0"/>
+              <a:t>https://blog.acolyer.org/2016/04/20/imagenet-classification-with-deep-convolutional-neural-networks/</a:t>
             </a:r>
           </a:p>
         </p:txBody>
@@ -7335,102 +7484,7 @@
     </p:spTree>
     <p:extLst>
       <p:ext uri="{BB962C8B-B14F-4D97-AF65-F5344CB8AC3E}">
-        <p14:creationId xmlns:p14="http://schemas.microsoft.com/office/powerpoint/2010/main" val="2072618729"/>
-      </p:ext>
-    </p:extLst>
-  </p:cSld>
-  <p:clrMapOvr>
-    <a:masterClrMapping/>
-  </p:clrMapOvr>
-  <p:transition>
-    <p:fade/>
-  </p:transition>
-</p:sld>
-</file>
-
-<file path=ppt/slides/slide18.xml><?xml version="1.0" encoding="utf-8"?>
-<p:sld xmlns:a="http://schemas.openxmlformats.org/drawingml/2006/main" xmlns:r="http://schemas.openxmlformats.org/officeDocument/2006/relationships" xmlns:p="http://schemas.openxmlformats.org/presentationml/2006/main">
-  <p:cSld>
-    <p:spTree>
-      <p:nvGrpSpPr>
-        <p:cNvPr id="1" name=""/>
-        <p:cNvGrpSpPr/>
-        <p:nvPr/>
-      </p:nvGrpSpPr>
-      <p:grpSpPr>
-        <a:xfrm>
-          <a:off x="0" y="0"/>
-          <a:ext cx="0" cy="0"/>
-          <a:chOff x="0" y="0"/>
-          <a:chExt cx="0" cy="0"/>
-        </a:xfrm>
-      </p:grpSpPr>
-      <p:sp>
-        <p:nvSpPr>
-          <p:cNvPr id="4" name="Title 3">
-            <a:extLst>
-              <a:ext uri="{FF2B5EF4-FFF2-40B4-BE49-F238E27FC236}">
-                <a16:creationId xmlns:a16="http://schemas.microsoft.com/office/drawing/2014/main" id="{BDEEF7C9-9913-4E9E-B2E1-24DC48660353}"/>
-              </a:ext>
-            </a:extLst>
-          </p:cNvPr>
-          <p:cNvSpPr>
-            <a:spLocks noGrp="1"/>
-          </p:cNvSpPr>
-          <p:nvPr>
-            <p:ph type="title"/>
-          </p:nvPr>
-        </p:nvSpPr>
-        <p:spPr/>
-        <p:txBody>
-          <a:bodyPr/>
-          <a:lstStyle/>
-          <a:p>
-            <a:r>
-              <a:rPr lang="en-US" dirty="0" err="1"/>
-              <a:t>AlexNet</a:t>
-            </a:r>
-            <a:r>
-              <a:rPr lang="en-US" dirty="0"/>
-              <a:t> </a:t>
-            </a:r>
-            <a:r>
-              <a:rPr lang="en-US"/>
-              <a:t>Implementaion</a:t>
-            </a:r>
-            <a:endParaRPr lang="en-US" dirty="0"/>
-          </a:p>
-        </p:txBody>
-      </p:sp>
-      <p:sp>
-        <p:nvSpPr>
-          <p:cNvPr id="5" name="Text Placeholder 4">
-            <a:extLst>
-              <a:ext uri="{FF2B5EF4-FFF2-40B4-BE49-F238E27FC236}">
-                <a16:creationId xmlns:a16="http://schemas.microsoft.com/office/drawing/2014/main" id="{22C2E355-E2EA-42D2-AA35-333C561CA354}"/>
-              </a:ext>
-            </a:extLst>
-          </p:cNvPr>
-          <p:cNvSpPr>
-            <a:spLocks noGrp="1"/>
-          </p:cNvSpPr>
-          <p:nvPr>
-            <p:ph type="body" idx="1"/>
-          </p:nvPr>
-        </p:nvSpPr>
-        <p:spPr/>
-        <p:txBody>
-          <a:bodyPr/>
-          <a:lstStyle/>
-          <a:p>
-            <a:endParaRPr lang="en-US"/>
-          </a:p>
-        </p:txBody>
-      </p:sp>
-    </p:spTree>
-    <p:extLst>
-      <p:ext uri="{BB962C8B-B14F-4D97-AF65-F5344CB8AC3E}">
-        <p14:creationId xmlns:p14="http://schemas.microsoft.com/office/powerpoint/2010/main" val="3196821120"/>
+        <p14:creationId xmlns:p14="http://schemas.microsoft.com/office/powerpoint/2010/main" val="2002838871"/>
       </p:ext>
     </p:extLst>
   </p:cSld>
@@ -7810,6 +7864,41 @@
           </a:p>
         </p:txBody>
       </p:sp>
+      <p:sp>
+        <p:nvSpPr>
+          <p:cNvPr id="4" name="TextBox 3">
+            <a:extLst>
+              <a:ext uri="{FF2B5EF4-FFF2-40B4-BE49-F238E27FC236}">
+                <a16:creationId xmlns:a16="http://schemas.microsoft.com/office/drawing/2014/main" id="{897BDC21-3818-42DB-98DE-2B2FEC2A629F}"/>
+              </a:ext>
+            </a:extLst>
+          </p:cNvPr>
+          <p:cNvSpPr txBox="1"/>
+          <p:nvPr/>
+        </p:nvSpPr>
+        <p:spPr>
+          <a:xfrm>
+            <a:off x="0" y="6488668"/>
+            <a:ext cx="8741496" cy="369332"/>
+          </a:xfrm>
+          <a:prstGeom prst="rect">
+            <a:avLst/>
+          </a:prstGeom>
+          <a:noFill/>
+        </p:spPr>
+        <p:txBody>
+          <a:bodyPr wrap="none" rtlCol="0">
+            <a:spAutoFit/>
+          </a:bodyPr>
+          <a:lstStyle/>
+          <a:p>
+            <a:r>
+              <a:rPr lang="en-US" dirty="0"/>
+              <a:t>http://papers.nips.cc/paper/5004-deep-content-based-music-recommendation.pdf</a:t>
+            </a:r>
+          </a:p>
+        </p:txBody>
+      </p:sp>
     </p:spTree>
     <p:extLst>
       <p:ext uri="{BB962C8B-B14F-4D97-AF65-F5344CB8AC3E}">
@@ -7927,7 +8016,7 @@
             <a:pPr lvl="1"/>
             <a:r>
               <a:rPr lang="en-US" dirty="0"/>
-              <a:t>Another reason that MLP’s suffer is that they do not take into account the spatial relation of pixels.</a:t>
+              <a:t>Another reason that MLP’s performance suffers is that they do not take into account the spatial relation of pixels.</a:t>
             </a:r>
           </a:p>
           <a:p>
@@ -7957,7 +8046,7 @@
         </p:nvSpPr>
         <p:spPr>
           <a:xfrm>
-            <a:off x="-71394" y="4529380"/>
+            <a:off x="2867634" y="4987400"/>
             <a:ext cx="1071126" cy="646331"/>
           </a:xfrm>
           <a:prstGeom prst="rect">
@@ -8000,7 +8089,7 @@
         </p:nvGrpSpPr>
         <p:grpSpPr>
           <a:xfrm>
-            <a:off x="967673" y="4358936"/>
+            <a:off x="3967580" y="4358936"/>
             <a:ext cx="1208841" cy="2330012"/>
             <a:chOff x="967673" y="4358936"/>
             <a:chExt cx="1208841" cy="2330012"/>
@@ -9647,6 +9736,14 @@
           <a:p>
             <a:pPr lvl="1"/>
             <a:r>
+              <a:rPr lang="en-US" dirty="0" err="1"/>
+              <a:t>ReLU</a:t>
+            </a:r>
+            <a:endParaRPr lang="en-US" dirty="0"/>
+          </a:p>
+          <a:p>
+            <a:pPr lvl="1"/>
+            <a:r>
               <a:rPr lang="en-US" dirty="0"/>
               <a:t>Fully Connected (The same as a hidden layer in a MLP)</a:t>
             </a:r>
@@ -9860,7 +9957,7 @@
             <a:pPr algn="ctr"/>
             <a:r>
               <a:rPr lang="en-US" dirty="0"/>
-              <a:t>Image from: http://cs231n.github.io/convolutional-networks/</a:t>
+              <a:t>http://cs231n.github.io/convolutional-networks/</a:t>
             </a:r>
           </a:p>
         </p:txBody>

</xml_diff>

<commit_message>
Added PCA Face Recognition
</commit_message>
<xml_diff>
--- a/ConvolutionNeuralNetwork.pptx
+++ b/ConvolutionNeuralNetwork.pptx
@@ -277,7 +277,7 @@
           <a:p>
             <a:fld id="{E91B00C2-1209-4D42-A5F6-19F8482CA1F8}" type="datetimeFigureOut">
               <a:rPr lang="en-US" smtClean="0"/>
-              <a:t>11/13/2017</a:t>
+              <a:t>11/14/2017</a:t>
             </a:fld>
             <a:endParaRPr lang="en-US"/>
           </a:p>
@@ -1290,7 +1290,7 @@
           <a:p>
             <a:fld id="{C51E4E97-A001-0F44-B0B9-428F1549067F}" type="datetimeFigureOut">
               <a:rPr lang="en-US" smtClean="0"/>
-              <a:t>11/13/2017</a:t>
+              <a:t>11/14/2017</a:t>
             </a:fld>
             <a:endParaRPr lang="en-US"/>
           </a:p>
@@ -1480,7 +1480,7 @@
           <a:p>
             <a:fld id="{C51E4E97-A001-0F44-B0B9-428F1549067F}" type="datetimeFigureOut">
               <a:rPr lang="en-US" smtClean="0"/>
-              <a:t>11/13/2017</a:t>
+              <a:t>11/14/2017</a:t>
             </a:fld>
             <a:endParaRPr lang="en-US"/>
           </a:p>
@@ -1662,7 +1662,7 @@
           <a:p>
             <a:fld id="{C51E4E97-A001-0F44-B0B9-428F1549067F}" type="datetimeFigureOut">
               <a:rPr lang="en-US" smtClean="0"/>
-              <a:t>11/13/2017</a:t>
+              <a:t>11/14/2017</a:t>
             </a:fld>
             <a:endParaRPr lang="en-US"/>
           </a:p>
@@ -2084,7 +2084,7 @@
           <a:p>
             <a:fld id="{C51E4E97-A001-0F44-B0B9-428F1549067F}" type="datetimeFigureOut">
               <a:rPr lang="en-US" smtClean="0"/>
-              <a:t>11/13/2017</a:t>
+              <a:t>11/14/2017</a:t>
             </a:fld>
             <a:endParaRPr lang="en-US"/>
           </a:p>
@@ -2460,7 +2460,7 @@
           <a:p>
             <a:fld id="{C51E4E97-A001-0F44-B0B9-428F1549067F}" type="datetimeFigureOut">
               <a:rPr lang="en-US" smtClean="0"/>
-              <a:t>11/13/2017</a:t>
+              <a:t>11/14/2017</a:t>
             </a:fld>
             <a:endParaRPr lang="en-US"/>
           </a:p>
@@ -2871,7 +2871,7 @@
           <a:p>
             <a:fld id="{C51E4E97-A001-0F44-B0B9-428F1549067F}" type="datetimeFigureOut">
               <a:rPr lang="en-US" smtClean="0"/>
-              <a:t>11/13/2017</a:t>
+              <a:t>11/14/2017</a:t>
             </a:fld>
             <a:endParaRPr lang="en-US"/>
           </a:p>
@@ -3009,7 +3009,7 @@
           <a:p>
             <a:fld id="{C51E4E97-A001-0F44-B0B9-428F1549067F}" type="datetimeFigureOut">
               <a:rPr lang="en-US" smtClean="0"/>
-              <a:t>11/13/2017</a:t>
+              <a:t>11/14/2017</a:t>
             </a:fld>
             <a:endParaRPr lang="en-US"/>
           </a:p>
@@ -3117,7 +3117,7 @@
           <a:p>
             <a:fld id="{C51E4E97-A001-0F44-B0B9-428F1549067F}" type="datetimeFigureOut">
               <a:rPr lang="en-US" smtClean="0"/>
-              <a:t>11/13/2017</a:t>
+              <a:t>11/14/2017</a:t>
             </a:fld>
             <a:endParaRPr lang="en-US"/>
           </a:p>
@@ -3369,7 +3369,7 @@
           <a:p>
             <a:fld id="{C51E4E97-A001-0F44-B0B9-428F1549067F}" type="datetimeFigureOut">
               <a:rPr lang="en-US" smtClean="0"/>
-              <a:t>11/13/2017</a:t>
+              <a:t>11/14/2017</a:t>
             </a:fld>
             <a:endParaRPr lang="en-US"/>
           </a:p>
@@ -3620,7 +3620,7 @@
           <a:p>
             <a:fld id="{C51E4E97-A001-0F44-B0B9-428F1549067F}" type="datetimeFigureOut">
               <a:rPr lang="en-US" smtClean="0"/>
-              <a:t>11/13/2017</a:t>
+              <a:t>11/14/2017</a:t>
             </a:fld>
             <a:endParaRPr lang="en-US"/>
           </a:p>
@@ -4450,7 +4450,7 @@
           <a:p>
             <a:fld id="{C51E4E97-A001-0F44-B0B9-428F1549067F}" type="datetimeFigureOut">
               <a:rPr lang="en-US" smtClean="0"/>
-              <a:t>11/13/2017</a:t>
+              <a:t>11/14/2017</a:t>
             </a:fld>
             <a:endParaRPr lang="en-US"/>
           </a:p>
@@ -6696,7 +6696,12 @@
             <p:ph idx="1"/>
           </p:nvPr>
         </p:nvSpPr>
-        <p:spPr/>
+        <p:spPr>
+          <a:xfrm>
+            <a:off x="0" y="968031"/>
+            <a:ext cx="9144000" cy="5168425"/>
+          </a:xfrm>
+        </p:spPr>
         <p:txBody>
           <a:bodyPr/>
           <a:lstStyle/>
@@ -6734,7 +6739,15 @@
             </a:r>
             <a:r>
               <a:rPr lang="en-US" dirty="0"/>
-              <a:t> keeps the weights at each node from increasing to infinity or getting stuck near zero.</a:t>
+              <a:t> keeps the weights at each node from increasing to infinity or getting stuck near zero. (Look up variations on </a:t>
+            </a:r>
+            <a:r>
+              <a:rPr lang="en-US" dirty="0" err="1"/>
+              <a:t>ReLU</a:t>
+            </a:r>
+            <a:r>
+              <a:rPr lang="en-US" dirty="0"/>
+              <a:t>) (Why does it keep nodes from increasing to infinity)</a:t>
             </a:r>
           </a:p>
           <a:p>
@@ -6775,8 +6788,8 @@
         </p:blipFill>
         <p:spPr>
           <a:xfrm>
-            <a:off x="2387600" y="4175172"/>
-            <a:ext cx="4368800" cy="2174352"/>
+            <a:off x="2144116" y="4003825"/>
+            <a:ext cx="4855768" cy="2416716"/>
           </a:xfrm>
           <a:prstGeom prst="rect">
             <a:avLst/>
@@ -6902,13 +6915,7 @@
           <a:p>
             <a:r>
               <a:rPr lang="en-US" dirty="0"/>
-              <a:t>This is the same as a layer from an MLP</a:t>
-            </a:r>
-          </a:p>
-          <a:p>
-            <a:r>
-              <a:rPr lang="en-US" dirty="0"/>
-              <a:t>These layers are placed at the end of the network to determine which class each image belongs in.</a:t>
+              <a:t>Works the same as a hidden layer from an MLP</a:t>
             </a:r>
           </a:p>
           <a:p>
@@ -6945,8 +6952,8 @@
         </p:blipFill>
         <p:spPr>
           <a:xfrm>
-            <a:off x="2251868" y="3234827"/>
-            <a:ext cx="4640263" cy="3114697"/>
+            <a:off x="1870128" y="2814221"/>
+            <a:ext cx="5266880" cy="3535303"/>
           </a:xfrm>
           <a:prstGeom prst="rect">
             <a:avLst/>
@@ -7558,7 +7565,12 @@
             <p:ph idx="1"/>
           </p:nvPr>
         </p:nvSpPr>
-        <p:spPr/>
+        <p:spPr>
+          <a:xfrm>
+            <a:off x="0" y="1181099"/>
+            <a:ext cx="9144000" cy="5168425"/>
+          </a:xfrm>
+        </p:spPr>
         <p:txBody>
           <a:bodyPr/>
           <a:lstStyle/>
@@ -7608,12 +7620,6 @@
             <a:r>
               <a:rPr lang="en-US" dirty="0"/>
               <a:t>Fully Connected</a:t>
-            </a:r>
-          </a:p>
-          <a:p>
-            <a:r>
-              <a:rPr lang="en-US" dirty="0"/>
-              <a:t>Adjustable Parameters</a:t>
             </a:r>
           </a:p>
           <a:p>

</xml_diff>

<commit_message>
Adding CNN ppt and PCA and GMM
</commit_message>
<xml_diff>
--- a/ConvolutionNeuralNetwork.pptx
+++ b/ConvolutionNeuralNetwork.pptx
@@ -277,7 +277,7 @@
           <a:p>
             <a:fld id="{E91B00C2-1209-4D42-A5F6-19F8482CA1F8}" type="datetimeFigureOut">
               <a:rPr lang="en-US" smtClean="0"/>
-              <a:t>11/14/2017</a:t>
+              <a:t>12/6/2017</a:t>
             </a:fld>
             <a:endParaRPr lang="en-US"/>
           </a:p>
@@ -1290,7 +1290,7 @@
           <a:p>
             <a:fld id="{C51E4E97-A001-0F44-B0B9-428F1549067F}" type="datetimeFigureOut">
               <a:rPr lang="en-US" smtClean="0"/>
-              <a:t>11/14/2017</a:t>
+              <a:t>12/6/2017</a:t>
             </a:fld>
             <a:endParaRPr lang="en-US"/>
           </a:p>
@@ -1480,7 +1480,7 @@
           <a:p>
             <a:fld id="{C51E4E97-A001-0F44-B0B9-428F1549067F}" type="datetimeFigureOut">
               <a:rPr lang="en-US" smtClean="0"/>
-              <a:t>11/14/2017</a:t>
+              <a:t>12/6/2017</a:t>
             </a:fld>
             <a:endParaRPr lang="en-US"/>
           </a:p>
@@ -1662,7 +1662,7 @@
           <a:p>
             <a:fld id="{C51E4E97-A001-0F44-B0B9-428F1549067F}" type="datetimeFigureOut">
               <a:rPr lang="en-US" smtClean="0"/>
-              <a:t>11/14/2017</a:t>
+              <a:t>12/6/2017</a:t>
             </a:fld>
             <a:endParaRPr lang="en-US"/>
           </a:p>
@@ -2084,7 +2084,7 @@
           <a:p>
             <a:fld id="{C51E4E97-A001-0F44-B0B9-428F1549067F}" type="datetimeFigureOut">
               <a:rPr lang="en-US" smtClean="0"/>
-              <a:t>11/14/2017</a:t>
+              <a:t>12/6/2017</a:t>
             </a:fld>
             <a:endParaRPr lang="en-US"/>
           </a:p>
@@ -2460,7 +2460,7 @@
           <a:p>
             <a:fld id="{C51E4E97-A001-0F44-B0B9-428F1549067F}" type="datetimeFigureOut">
               <a:rPr lang="en-US" smtClean="0"/>
-              <a:t>11/14/2017</a:t>
+              <a:t>12/6/2017</a:t>
             </a:fld>
             <a:endParaRPr lang="en-US"/>
           </a:p>
@@ -2871,7 +2871,7 @@
           <a:p>
             <a:fld id="{C51E4E97-A001-0F44-B0B9-428F1549067F}" type="datetimeFigureOut">
               <a:rPr lang="en-US" smtClean="0"/>
-              <a:t>11/14/2017</a:t>
+              <a:t>12/6/2017</a:t>
             </a:fld>
             <a:endParaRPr lang="en-US"/>
           </a:p>
@@ -3009,7 +3009,7 @@
           <a:p>
             <a:fld id="{C51E4E97-A001-0F44-B0B9-428F1549067F}" type="datetimeFigureOut">
               <a:rPr lang="en-US" smtClean="0"/>
-              <a:t>11/14/2017</a:t>
+              <a:t>12/6/2017</a:t>
             </a:fld>
             <a:endParaRPr lang="en-US"/>
           </a:p>
@@ -3117,7 +3117,7 @@
           <a:p>
             <a:fld id="{C51E4E97-A001-0F44-B0B9-428F1549067F}" type="datetimeFigureOut">
               <a:rPr lang="en-US" smtClean="0"/>
-              <a:t>11/14/2017</a:t>
+              <a:t>12/6/2017</a:t>
             </a:fld>
             <a:endParaRPr lang="en-US"/>
           </a:p>
@@ -3369,7 +3369,7 @@
           <a:p>
             <a:fld id="{C51E4E97-A001-0F44-B0B9-428F1549067F}" type="datetimeFigureOut">
               <a:rPr lang="en-US" smtClean="0"/>
-              <a:t>11/14/2017</a:t>
+              <a:t>12/6/2017</a:t>
             </a:fld>
             <a:endParaRPr lang="en-US"/>
           </a:p>
@@ -3620,7 +3620,7 @@
           <a:p>
             <a:fld id="{C51E4E97-A001-0F44-B0B9-428F1549067F}" type="datetimeFigureOut">
               <a:rPr lang="en-US" smtClean="0"/>
-              <a:t>11/14/2017</a:t>
+              <a:t>12/6/2017</a:t>
             </a:fld>
             <a:endParaRPr lang="en-US"/>
           </a:p>
@@ -4450,7 +4450,7 @@
           <a:p>
             <a:fld id="{C51E4E97-A001-0F44-B0B9-428F1549067F}" type="datetimeFigureOut">
               <a:rPr lang="en-US" smtClean="0"/>
-              <a:t>11/14/2017</a:t>
+              <a:t>12/6/2017</a:t>
             </a:fld>
             <a:endParaRPr lang="en-US"/>
           </a:p>
@@ -6680,92 +6680,195 @@
           </a:p>
         </p:txBody>
       </p:sp>
-      <p:sp>
-        <p:nvSpPr>
-          <p:cNvPr id="3" name="Content Placeholder 2">
-            <a:extLst>
-              <a:ext uri="{FF2B5EF4-FFF2-40B4-BE49-F238E27FC236}">
-                <a16:creationId xmlns:a16="http://schemas.microsoft.com/office/drawing/2014/main" id="{78696358-6B19-48F9-B619-B85E1331964B}"/>
-              </a:ext>
-            </a:extLst>
-          </p:cNvPr>
-          <p:cNvSpPr>
-            <a:spLocks noGrp="1"/>
-          </p:cNvSpPr>
-          <p:nvPr>
-            <p:ph idx="1"/>
-          </p:nvPr>
-        </p:nvSpPr>
-        <p:spPr>
-          <a:xfrm>
-            <a:off x="0" y="968031"/>
-            <a:ext cx="9144000" cy="5168425"/>
-          </a:xfrm>
-        </p:spPr>
-        <p:txBody>
-          <a:bodyPr/>
-          <a:lstStyle/>
-          <a:p>
-            <a:pPr marL="109728" indent="0">
-              <a:buNone/>
-            </a:pPr>
-            <a:r>
-              <a:rPr lang="en-US" dirty="0" err="1"/>
-              <a:t>ReLU</a:t>
-            </a:r>
-            <a:r>
-              <a:rPr lang="en-US" dirty="0"/>
-              <a:t> stands for Rectified Linear Unit. This layer is responsible for computing the outputs of the CNN neurons.</a:t>
-            </a:r>
-          </a:p>
-          <a:p>
-            <a:r>
-              <a:rPr lang="en-US" dirty="0"/>
-              <a:t>The main purpose of the </a:t>
-            </a:r>
-            <a:r>
-              <a:rPr lang="en-US" dirty="0" err="1"/>
-              <a:t>ReLU</a:t>
-            </a:r>
-            <a:r>
-              <a:rPr lang="en-US" dirty="0"/>
-              <a:t> is to set all negative values to zero. </a:t>
-            </a:r>
-          </a:p>
-          <a:p>
-            <a:r>
-              <a:rPr lang="en-US" dirty="0" err="1"/>
-              <a:t>ReLU</a:t>
-            </a:r>
-            <a:r>
-              <a:rPr lang="en-US" dirty="0"/>
-              <a:t> keeps the weights at each node from increasing to infinity or getting stuck near zero. (Look up variations on </a:t>
-            </a:r>
-            <a:r>
-              <a:rPr lang="en-US" dirty="0" err="1"/>
-              <a:t>ReLU</a:t>
-            </a:r>
-            <a:r>
-              <a:rPr lang="en-US" dirty="0"/>
-              <a:t>) (Why does it keep nodes from increasing to infinity)</a:t>
-            </a:r>
-          </a:p>
-          <a:p>
-            <a:r>
-              <a:rPr lang="en-US" dirty="0"/>
-              <a:t>The output size of a </a:t>
-            </a:r>
-            <a:r>
-              <a:rPr lang="en-US" dirty="0" err="1"/>
-              <a:t>ReLU</a:t>
-            </a:r>
-            <a:r>
-              <a:rPr lang="en-US" dirty="0"/>
-              <a:t> layer is identical to the input size.</a:t>
-            </a:r>
-          </a:p>
-        </p:txBody>
-      </p:sp>
+      <mc:AlternateContent xmlns:mc="http://schemas.openxmlformats.org/markup-compatibility/2006">
+        <mc:Choice xmlns:a14="http://schemas.microsoft.com/office/drawing/2010/main" Requires="a14">
+          <p:sp>
+            <p:nvSpPr>
+              <p:cNvPr id="3" name="Content Placeholder 2">
+                <a:extLst>
+                  <a:ext uri="{FF2B5EF4-FFF2-40B4-BE49-F238E27FC236}">
+                    <a16:creationId xmlns:a16="http://schemas.microsoft.com/office/drawing/2014/main" id="{78696358-6B19-48F9-B619-B85E1331964B}"/>
+                  </a:ext>
+                </a:extLst>
+              </p:cNvPr>
+              <p:cNvSpPr>
+                <a:spLocks noGrp="1"/>
+              </p:cNvSpPr>
+              <p:nvPr>
+                <p:ph idx="1"/>
+              </p:nvPr>
+            </p:nvSpPr>
+            <p:spPr>
+              <a:xfrm>
+                <a:off x="0" y="968031"/>
+                <a:ext cx="9144000" cy="5168425"/>
+              </a:xfrm>
+            </p:spPr>
+            <p:txBody>
+              <a:bodyPr/>
+              <a:lstStyle/>
+              <a:p>
+                <a:pPr marL="109728" indent="0">
+                  <a:buNone/>
+                </a:pPr>
+                <a:r>
+                  <a:rPr lang="en-US" dirty="0"/>
+                  <a:t>ReLU stands for Rectified Linear Unit. This layer is responsible for computing the outputs of the CNN neurons.</a:t>
+                </a:r>
+              </a:p>
+              <a:p>
+                <a:r>
+                  <a:rPr lang="en-US" dirty="0"/>
+                  <a:t>The main purpose of the </a:t>
+                </a:r>
+                <a:r>
+                  <a:rPr lang="en-US" dirty="0" err="1"/>
+                  <a:t>ReLU</a:t>
+                </a:r>
+                <a:r>
+                  <a:rPr lang="en-US" dirty="0"/>
+                  <a:t> is to set all negative values to zero. </a:t>
+                </a:r>
+              </a:p>
+              <a:p>
+                <a:r>
+                  <a:rPr lang="en-US" dirty="0" err="1"/>
+                  <a:t>ReLU</a:t>
+                </a:r>
+                <a:r>
+                  <a:rPr lang="en-US" dirty="0"/>
+                  <a:t> is easy to compute as it is just comparison, addition, and multiplication.</a:t>
+                </a:r>
+              </a:p>
+              <a:p>
+                <a:pPr marL="109728" indent="0">
+                  <a:buNone/>
+                </a:pPr>
+                <a14:m>
+                  <m:oMathPara xmlns:m="http://schemas.openxmlformats.org/officeDocument/2006/math">
+                    <m:oMathParaPr>
+                      <m:jc m:val="centerGroup"/>
+                    </m:oMathParaPr>
+                    <m:oMath xmlns:m="http://schemas.openxmlformats.org/officeDocument/2006/math">
+                      <m:r>
+                        <a:rPr lang="en-US" b="0" i="1" smtClean="0">
+                          <a:latin typeface="Cambria Math" panose="02040503050406030204" pitchFamily="18" charset="0"/>
+                        </a:rPr>
+                        <m:t>𝑓</m:t>
+                      </m:r>
+                      <m:d>
+                        <m:dPr>
+                          <m:ctrlPr>
+                            <a:rPr lang="en-US" b="0" i="1" smtClean="0">
+                              <a:latin typeface="Cambria Math" panose="02040503050406030204" pitchFamily="18" charset="0"/>
+                            </a:rPr>
+                          </m:ctrlPr>
+                        </m:dPr>
+                        <m:e>
+                          <m:r>
+                            <a:rPr lang="en-US" b="0" i="1" smtClean="0">
+                              <a:latin typeface="Cambria Math" panose="02040503050406030204" pitchFamily="18" charset="0"/>
+                            </a:rPr>
+                            <m:t>𝑥</m:t>
+                          </m:r>
+                        </m:e>
+                      </m:d>
+                      <m:r>
+                        <a:rPr lang="en-US" b="0" i="1" smtClean="0">
+                          <a:latin typeface="Cambria Math" panose="02040503050406030204" pitchFamily="18" charset="0"/>
+                        </a:rPr>
+                        <m:t>=</m:t>
+                      </m:r>
+                      <m:r>
+                        <a:rPr lang="en-US" b="0" i="1" smtClean="0">
+                          <a:latin typeface="Cambria Math" panose="02040503050406030204" pitchFamily="18" charset="0"/>
+                        </a:rPr>
+                        <m:t>𝑚𝑎𝑥</m:t>
+                      </m:r>
+                      <m:r>
+                        <a:rPr lang="en-US" b="0" i="1" smtClean="0">
+                          <a:latin typeface="Cambria Math" panose="02040503050406030204" pitchFamily="18" charset="0"/>
+                        </a:rPr>
+                        <m:t>⁡(0,</m:t>
+                      </m:r>
+                      <m:r>
+                        <a:rPr lang="en-US" b="0" i="1" smtClean="0">
+                          <a:latin typeface="Cambria Math" panose="02040503050406030204" pitchFamily="18" charset="0"/>
+                        </a:rPr>
+                        <m:t>𝑥</m:t>
+                      </m:r>
+                      <m:r>
+                        <a:rPr lang="en-US" b="0" i="1" smtClean="0">
+                          <a:latin typeface="Cambria Math" panose="02040503050406030204" pitchFamily="18" charset="0"/>
+                        </a:rPr>
+                        <m:t>)</m:t>
+                      </m:r>
+                    </m:oMath>
+                  </m:oMathPara>
+                </a14:m>
+                <a:endParaRPr lang="en-US" dirty="0"/>
+              </a:p>
+              <a:p>
+                <a:r>
+                  <a:rPr lang="en-US" dirty="0"/>
+                  <a:t>The output size of a </a:t>
+                </a:r>
+                <a:r>
+                  <a:rPr lang="en-US" dirty="0" err="1"/>
+                  <a:t>ReLU</a:t>
+                </a:r>
+                <a:r>
+                  <a:rPr lang="en-US" dirty="0"/>
+                  <a:t> layer is identical to the input size.</a:t>
+                </a:r>
+              </a:p>
+            </p:txBody>
+          </p:sp>
+        </mc:Choice>
+        <mc:Fallback>
+          <p:sp>
+            <p:nvSpPr>
+              <p:cNvPr id="3" name="Content Placeholder 2">
+                <a:extLst>
+                  <a:ext uri="{FF2B5EF4-FFF2-40B4-BE49-F238E27FC236}">
+                    <a16:creationId xmlns:a16="http://schemas.microsoft.com/office/drawing/2014/main" id="{78696358-6B19-48F9-B619-B85E1331964B}"/>
+                  </a:ext>
+                </a:extLst>
+              </p:cNvPr>
+              <p:cNvSpPr>
+                <a:spLocks noGrp="1" noRot="1" noChangeAspect="1" noMove="1" noResize="1" noEditPoints="1" noAdjustHandles="1" noChangeArrowheads="1" noChangeShapeType="1" noTextEdit="1"/>
+              </p:cNvSpPr>
+              <p:nvPr>
+                <p:ph idx="1"/>
+              </p:nvPr>
+            </p:nvSpPr>
+            <p:spPr>
+              <a:xfrm>
+                <a:off x="0" y="968031"/>
+                <a:ext cx="9144000" cy="5168425"/>
+              </a:xfrm>
+              <a:blipFill>
+                <a:blip r:embed="rId2"/>
+                <a:stretch>
+                  <a:fillRect t="-825"/>
+                </a:stretch>
+              </a:blipFill>
+            </p:spPr>
+            <p:txBody>
+              <a:bodyPr/>
+              <a:lstStyle/>
+              <a:p>
+                <a:r>
+                  <a:rPr lang="en-US">
+                    <a:noFill/>
+                  </a:rPr>
+                  <a:t> </a:t>
+                </a:r>
+              </a:p>
+            </p:txBody>
+          </p:sp>
+        </mc:Fallback>
+      </mc:AlternateContent>
       <p:pic>
         <p:nvPicPr>
           <p:cNvPr id="4" name="Picture 3">
@@ -6781,7 +6884,7 @@
           <p:nvPr/>
         </p:nvPicPr>
         <p:blipFill>
-          <a:blip r:embed="rId2"/>
+          <a:blip r:embed="rId3"/>
           <a:stretch>
             <a:fillRect/>
           </a:stretch>

</xml_diff>